<commit_message>
Update doc : Preparation #4
아마도 x2 진짜 완료?
</commit_message>
<xml_diff>
--- a/doc/구성도편집.pptx
+++ b/doc/구성도편집.pptx
@@ -243,7 +243,7 @@
           <a:p>
             <a:fld id="{FC737AC3-74AD-E34D-9375-2CDFDF5CB8AB}" type="datetimeFigureOut">
               <a:rPr kumimoji="1" lang="ko-KR" altLang="en-US" smtClean="0"/>
-              <a:t>2019. 9. 25.</a:t>
+              <a:t>2019. 9. 26.</a:t>
             </a:fld>
             <a:endParaRPr kumimoji="1" lang="ko-KR" altLang="en-US"/>
           </a:p>
@@ -413,7 +413,7 @@
           <a:p>
             <a:fld id="{FC737AC3-74AD-E34D-9375-2CDFDF5CB8AB}" type="datetimeFigureOut">
               <a:rPr kumimoji="1" lang="ko-KR" altLang="en-US" smtClean="0"/>
-              <a:t>2019. 9. 25.</a:t>
+              <a:t>2019. 9. 26.</a:t>
             </a:fld>
             <a:endParaRPr kumimoji="1" lang="ko-KR" altLang="en-US"/>
           </a:p>
@@ -593,7 +593,7 @@
           <a:p>
             <a:fld id="{FC737AC3-74AD-E34D-9375-2CDFDF5CB8AB}" type="datetimeFigureOut">
               <a:rPr kumimoji="1" lang="ko-KR" altLang="en-US" smtClean="0"/>
-              <a:t>2019. 9. 25.</a:t>
+              <a:t>2019. 9. 26.</a:t>
             </a:fld>
             <a:endParaRPr kumimoji="1" lang="ko-KR" altLang="en-US"/>
           </a:p>
@@ -763,7 +763,7 @@
           <a:p>
             <a:fld id="{FC737AC3-74AD-E34D-9375-2CDFDF5CB8AB}" type="datetimeFigureOut">
               <a:rPr kumimoji="1" lang="ko-KR" altLang="en-US" smtClean="0"/>
-              <a:t>2019. 9. 25.</a:t>
+              <a:t>2019. 9. 26.</a:t>
             </a:fld>
             <a:endParaRPr kumimoji="1" lang="ko-KR" altLang="en-US"/>
           </a:p>
@@ -1007,7 +1007,7 @@
           <a:p>
             <a:fld id="{FC737AC3-74AD-E34D-9375-2CDFDF5CB8AB}" type="datetimeFigureOut">
               <a:rPr kumimoji="1" lang="ko-KR" altLang="en-US" smtClean="0"/>
-              <a:t>2019. 9. 25.</a:t>
+              <a:t>2019. 9. 26.</a:t>
             </a:fld>
             <a:endParaRPr kumimoji="1" lang="ko-KR" altLang="en-US"/>
           </a:p>
@@ -1239,7 +1239,7 @@
           <a:p>
             <a:fld id="{FC737AC3-74AD-E34D-9375-2CDFDF5CB8AB}" type="datetimeFigureOut">
               <a:rPr kumimoji="1" lang="ko-KR" altLang="en-US" smtClean="0"/>
-              <a:t>2019. 9. 25.</a:t>
+              <a:t>2019. 9. 26.</a:t>
             </a:fld>
             <a:endParaRPr kumimoji="1" lang="ko-KR" altLang="en-US"/>
           </a:p>
@@ -1606,7 +1606,7 @@
           <a:p>
             <a:fld id="{FC737AC3-74AD-E34D-9375-2CDFDF5CB8AB}" type="datetimeFigureOut">
               <a:rPr kumimoji="1" lang="ko-KR" altLang="en-US" smtClean="0"/>
-              <a:t>2019. 9. 25.</a:t>
+              <a:t>2019. 9. 26.</a:t>
             </a:fld>
             <a:endParaRPr kumimoji="1" lang="ko-KR" altLang="en-US"/>
           </a:p>
@@ -1724,7 +1724,7 @@
           <a:p>
             <a:fld id="{FC737AC3-74AD-E34D-9375-2CDFDF5CB8AB}" type="datetimeFigureOut">
               <a:rPr kumimoji="1" lang="ko-KR" altLang="en-US" smtClean="0"/>
-              <a:t>2019. 9. 25.</a:t>
+              <a:t>2019. 9. 26.</a:t>
             </a:fld>
             <a:endParaRPr kumimoji="1" lang="ko-KR" altLang="en-US"/>
           </a:p>
@@ -1819,7 +1819,7 @@
           <a:p>
             <a:fld id="{FC737AC3-74AD-E34D-9375-2CDFDF5CB8AB}" type="datetimeFigureOut">
               <a:rPr kumimoji="1" lang="ko-KR" altLang="en-US" smtClean="0"/>
-              <a:t>2019. 9. 25.</a:t>
+              <a:t>2019. 9. 26.</a:t>
             </a:fld>
             <a:endParaRPr kumimoji="1" lang="ko-KR" altLang="en-US"/>
           </a:p>
@@ -2096,7 +2096,7 @@
           <a:p>
             <a:fld id="{FC737AC3-74AD-E34D-9375-2CDFDF5CB8AB}" type="datetimeFigureOut">
               <a:rPr kumimoji="1" lang="ko-KR" altLang="en-US" smtClean="0"/>
-              <a:t>2019. 9. 25.</a:t>
+              <a:t>2019. 9. 26.</a:t>
             </a:fld>
             <a:endParaRPr kumimoji="1" lang="ko-KR" altLang="en-US"/>
           </a:p>
@@ -2353,7 +2353,7 @@
           <a:p>
             <a:fld id="{FC737AC3-74AD-E34D-9375-2CDFDF5CB8AB}" type="datetimeFigureOut">
               <a:rPr kumimoji="1" lang="ko-KR" altLang="en-US" smtClean="0"/>
-              <a:t>2019. 9. 25.</a:t>
+              <a:t>2019. 9. 26.</a:t>
             </a:fld>
             <a:endParaRPr kumimoji="1" lang="ko-KR" altLang="en-US"/>
           </a:p>
@@ -2566,7 +2566,7 @@
           <a:p>
             <a:fld id="{FC737AC3-74AD-E34D-9375-2CDFDF5CB8AB}" type="datetimeFigureOut">
               <a:rPr kumimoji="1" lang="ko-KR" altLang="en-US" smtClean="0"/>
-              <a:t>2019. 9. 25.</a:t>
+              <a:t>2019. 9. 26.</a:t>
             </a:fld>
             <a:endParaRPr kumimoji="1" lang="ko-KR" altLang="en-US"/>
           </a:p>
@@ -2973,10 +2973,10 @@
       </p:grpSpPr>
       <p:grpSp>
         <p:nvGrpSpPr>
-          <p:cNvPr id="12" name="그룹 11">
+          <p:cNvPr id="29" name="그룹 28">
             <a:extLst>
               <a:ext uri="{FF2B5EF4-FFF2-40B4-BE49-F238E27FC236}">
-                <a16:creationId xmlns:a16="http://schemas.microsoft.com/office/drawing/2014/main" id="{E1CB6457-C023-5841-A5D6-13E78258A9EB}"/>
+                <a16:creationId xmlns:a16="http://schemas.microsoft.com/office/drawing/2014/main" id="{B36EE888-00ED-B54D-8264-4AE0306A1D71}"/>
               </a:ext>
             </a:extLst>
           </p:cNvPr>
@@ -3038,10 +3038,10 @@
         </p:cxnSp>
         <p:grpSp>
           <p:nvGrpSpPr>
-            <p:cNvPr id="115" name="그룹 114">
+            <p:cNvPr id="27" name="그룹 26">
               <a:extLst>
                 <a:ext uri="{FF2B5EF4-FFF2-40B4-BE49-F238E27FC236}">
-                  <a16:creationId xmlns:a16="http://schemas.microsoft.com/office/drawing/2014/main" id="{06E4E4E1-DE24-AF46-9EA5-2F471941284A}"/>
+                  <a16:creationId xmlns:a16="http://schemas.microsoft.com/office/drawing/2014/main" id="{D0D7C426-FCF4-9D4B-9E1D-ED7E5E0554D4}"/>
                 </a:ext>
               </a:extLst>
             </p:cNvPr>
@@ -3050,18 +3050,18 @@
           </p:nvGrpSpPr>
           <p:grpSpPr>
             <a:xfrm>
-              <a:off x="7224451" y="1767341"/>
-              <a:ext cx="3184874" cy="1316032"/>
-              <a:chOff x="6204858" y="1367989"/>
-              <a:chExt cx="3184874" cy="1316032"/>
+              <a:off x="6835998" y="1767341"/>
+              <a:ext cx="5089296" cy="6162633"/>
+              <a:chOff x="6835998" y="1767341"/>
+              <a:chExt cx="5089296" cy="6162633"/>
             </a:xfrm>
           </p:grpSpPr>
           <p:grpSp>
             <p:nvGrpSpPr>
-              <p:cNvPr id="110" name="그룹 109">
+              <p:cNvPr id="115" name="그룹 114">
                 <a:extLst>
                   <a:ext uri="{FF2B5EF4-FFF2-40B4-BE49-F238E27FC236}">
-                    <a16:creationId xmlns:a16="http://schemas.microsoft.com/office/drawing/2014/main" id="{2D7D5E7D-8B7C-2143-A215-5B5CABD6274D}"/>
+                    <a16:creationId xmlns:a16="http://schemas.microsoft.com/office/drawing/2014/main" id="{06E4E4E1-DE24-AF46-9EA5-2F471941284A}"/>
                   </a:ext>
                 </a:extLst>
               </p:cNvPr>
@@ -3070,18 +3070,18 @@
             </p:nvGrpSpPr>
             <p:grpSpPr>
               <a:xfrm>
-                <a:off x="6204858" y="1770438"/>
-                <a:ext cx="3184874" cy="913583"/>
-                <a:chOff x="6314295" y="1782151"/>
-                <a:chExt cx="3184874" cy="913583"/>
+                <a:off x="7224451" y="1767341"/>
+                <a:ext cx="3184874" cy="1316032"/>
+                <a:chOff x="6204858" y="1367989"/>
+                <a:chExt cx="3184874" cy="1316032"/>
               </a:xfrm>
             </p:grpSpPr>
             <p:grpSp>
               <p:nvGrpSpPr>
-                <p:cNvPr id="107" name="그룹 106">
+                <p:cNvPr id="110" name="그룹 109">
                   <a:extLst>
                     <a:ext uri="{FF2B5EF4-FFF2-40B4-BE49-F238E27FC236}">
-                      <a16:creationId xmlns:a16="http://schemas.microsoft.com/office/drawing/2014/main" id="{B90F6367-7EA0-3A42-A42F-58179CA22CEB}"/>
+                      <a16:creationId xmlns:a16="http://schemas.microsoft.com/office/drawing/2014/main" id="{2D7D5E7D-8B7C-2143-A215-5B5CABD6274D}"/>
                     </a:ext>
                   </a:extLst>
                 </p:cNvPr>
@@ -3090,211 +3090,211 @@
               </p:nvGrpSpPr>
               <p:grpSpPr>
                 <a:xfrm>
-                  <a:off x="6443644" y="1888585"/>
-                  <a:ext cx="2891121" cy="681154"/>
-                  <a:chOff x="6443644" y="1888585"/>
-                  <a:chExt cx="2891121" cy="681154"/>
+                  <a:off x="6204858" y="1770438"/>
+                  <a:ext cx="3184874" cy="913583"/>
+                  <a:chOff x="6314295" y="1782151"/>
+                  <a:chExt cx="3184874" cy="913583"/>
                 </a:xfrm>
               </p:grpSpPr>
-              <p:pic>
-                <p:nvPicPr>
-                  <p:cNvPr id="26" name="그림 25">
+              <p:grpSp>
+                <p:nvGrpSpPr>
+                  <p:cNvPr id="107" name="그룹 106">
                     <a:extLst>
                       <a:ext uri="{FF2B5EF4-FFF2-40B4-BE49-F238E27FC236}">
-                        <a16:creationId xmlns:a16="http://schemas.microsoft.com/office/drawing/2014/main" id="{DAA496D0-5642-1540-B9F5-81208A729090}"/>
+                        <a16:creationId xmlns:a16="http://schemas.microsoft.com/office/drawing/2014/main" id="{B90F6367-7EA0-3A42-A42F-58179CA22CEB}"/>
                       </a:ext>
                     </a:extLst>
                   </p:cNvPr>
-                  <p:cNvPicPr>
-                    <a:picLocks noChangeAspect="1"/>
-                  </p:cNvPicPr>
+                  <p:cNvGrpSpPr/>
                   <p:nvPr/>
-                </p:nvPicPr>
-                <p:blipFill rotWithShape="1">
-                  <a:blip r:embed="rId2"/>
-                  <a:srcRect l="7890" t="25087" r="6996" b="6277"/>
-                  <a:stretch/>
-                </p:blipFill>
+                </p:nvGrpSpPr>
+                <p:grpSpPr>
+                  <a:xfrm>
+                    <a:off x="6443644" y="1888585"/>
+                    <a:ext cx="2891121" cy="681154"/>
+                    <a:chOff x="6443644" y="1888585"/>
+                    <a:chExt cx="2891121" cy="681154"/>
+                  </a:xfrm>
+                </p:grpSpPr>
+                <p:pic>
+                  <p:nvPicPr>
+                    <p:cNvPr id="26" name="그림 25">
+                      <a:extLst>
+                        <a:ext uri="{FF2B5EF4-FFF2-40B4-BE49-F238E27FC236}">
+                          <a16:creationId xmlns:a16="http://schemas.microsoft.com/office/drawing/2014/main" id="{DAA496D0-5642-1540-B9F5-81208A729090}"/>
+                        </a:ext>
+                      </a:extLst>
+                    </p:cNvPr>
+                    <p:cNvPicPr>
+                      <a:picLocks noChangeAspect="1"/>
+                    </p:cNvPicPr>
+                    <p:nvPr/>
+                  </p:nvPicPr>
+                  <p:blipFill rotWithShape="1">
+                    <a:blip r:embed="rId2"/>
+                    <a:srcRect l="7890" t="25087" r="6996" b="6277"/>
+                    <a:stretch/>
+                  </p:blipFill>
+                  <p:spPr>
+                    <a:xfrm>
+                      <a:off x="7802687" y="2032122"/>
+                      <a:ext cx="724277" cy="438047"/>
+                    </a:xfrm>
+                    <a:prstGeom prst="rect">
+                      <a:avLst/>
+                    </a:prstGeom>
+                  </p:spPr>
+                </p:pic>
+                <p:pic>
+                  <p:nvPicPr>
+                    <p:cNvPr id="28" name="그림 27">
+                      <a:extLst>
+                        <a:ext uri="{FF2B5EF4-FFF2-40B4-BE49-F238E27FC236}">
+                          <a16:creationId xmlns:a16="http://schemas.microsoft.com/office/drawing/2014/main" id="{A8BB1964-5FCB-9847-94F3-F4413ABBC1AB}"/>
+                        </a:ext>
+                      </a:extLst>
+                    </p:cNvPr>
+                    <p:cNvPicPr>
+                      <a:picLocks noChangeAspect="1"/>
+                    </p:cNvPicPr>
+                    <p:nvPr/>
+                  </p:nvPicPr>
+                  <p:blipFill>
+                    <a:blip r:embed="rId3"/>
+                    <a:stretch>
+                      <a:fillRect/>
+                    </a:stretch>
+                  </p:blipFill>
+                  <p:spPr>
+                    <a:xfrm>
+                      <a:off x="6443644" y="1992944"/>
+                      <a:ext cx="1238802" cy="358091"/>
+                    </a:xfrm>
+                    <a:prstGeom prst="rect">
+                      <a:avLst/>
+                    </a:prstGeom>
+                  </p:spPr>
+                </p:pic>
+                <p:pic>
+                  <p:nvPicPr>
+                    <p:cNvPr id="30" name="그림 29">
+                      <a:extLst>
+                        <a:ext uri="{FF2B5EF4-FFF2-40B4-BE49-F238E27FC236}">
+                          <a16:creationId xmlns:a16="http://schemas.microsoft.com/office/drawing/2014/main" id="{3337A815-43FC-E44D-9135-3FF852D55F80}"/>
+                        </a:ext>
+                      </a:extLst>
+                    </p:cNvPr>
+                    <p:cNvPicPr>
+                      <a:picLocks noChangeAspect="1"/>
+                    </p:cNvPicPr>
+                    <p:nvPr/>
+                  </p:nvPicPr>
+                  <p:blipFill rotWithShape="1">
+                    <a:blip r:embed="rId4"/>
+                    <a:srcRect l="26293" t="10064" r="26062" b="10160"/>
+                    <a:stretch/>
+                  </p:blipFill>
+                  <p:spPr>
+                    <a:xfrm>
+                      <a:off x="8610489" y="1888585"/>
+                      <a:ext cx="724276" cy="681154"/>
+                    </a:xfrm>
+                    <a:prstGeom prst="rect">
+                      <a:avLst/>
+                    </a:prstGeom>
+                  </p:spPr>
+                </p:pic>
+              </p:grpSp>
+              <p:sp>
+                <p:nvSpPr>
+                  <p:cNvPr id="108" name="직사각형 107">
+                    <a:extLst>
+                      <a:ext uri="{FF2B5EF4-FFF2-40B4-BE49-F238E27FC236}">
+                        <a16:creationId xmlns:a16="http://schemas.microsoft.com/office/drawing/2014/main" id="{3BDD12E5-F9BA-334C-A7A9-0D2074B88C83}"/>
+                      </a:ext>
+                    </a:extLst>
+                  </p:cNvPr>
+                  <p:cNvSpPr/>
+                  <p:nvPr/>
+                </p:nvSpPr>
                 <p:spPr>
                   <a:xfrm>
-                    <a:off x="7802687" y="2032122"/>
-                    <a:ext cx="724277" cy="438047"/>
+                    <a:off x="6314295" y="1782151"/>
+                    <a:ext cx="3184874" cy="913583"/>
                   </a:xfrm>
                   <a:prstGeom prst="rect">
                     <a:avLst/>
                   </a:prstGeom>
+                  <a:noFill/>
+                  <a:ln>
+                    <a:solidFill>
+                      <a:schemeClr val="tx1"/>
+                    </a:solidFill>
+                  </a:ln>
                 </p:spPr>
-              </p:pic>
-              <p:pic>
-                <p:nvPicPr>
-                  <p:cNvPr id="28" name="그림 27">
-                    <a:extLst>
-                      <a:ext uri="{FF2B5EF4-FFF2-40B4-BE49-F238E27FC236}">
-                        <a16:creationId xmlns:a16="http://schemas.microsoft.com/office/drawing/2014/main" id="{A8BB1964-5FCB-9847-94F3-F4413ABBC1AB}"/>
-                      </a:ext>
-                    </a:extLst>
-                  </p:cNvPr>
-                  <p:cNvPicPr>
-                    <a:picLocks noChangeAspect="1"/>
-                  </p:cNvPicPr>
-                  <p:nvPr/>
-                </p:nvPicPr>
-                <p:blipFill>
-                  <a:blip r:embed="rId3"/>
-                  <a:stretch>
-                    <a:fillRect/>
-                  </a:stretch>
-                </p:blipFill>
-                <p:spPr>
-                  <a:xfrm>
-                    <a:off x="6443644" y="1992944"/>
-                    <a:ext cx="1238802" cy="358091"/>
-                  </a:xfrm>
-                  <a:prstGeom prst="rect">
-                    <a:avLst/>
-                  </a:prstGeom>
-                </p:spPr>
-              </p:pic>
-              <p:pic>
-                <p:nvPicPr>
-                  <p:cNvPr id="30" name="그림 29">
-                    <a:extLst>
-                      <a:ext uri="{FF2B5EF4-FFF2-40B4-BE49-F238E27FC236}">
-                        <a16:creationId xmlns:a16="http://schemas.microsoft.com/office/drawing/2014/main" id="{3337A815-43FC-E44D-9135-3FF852D55F80}"/>
-                      </a:ext>
-                    </a:extLst>
-                  </p:cNvPr>
-                  <p:cNvPicPr>
-                    <a:picLocks noChangeAspect="1"/>
-                  </p:cNvPicPr>
-                  <p:nvPr/>
-                </p:nvPicPr>
-                <p:blipFill rotWithShape="1">
-                  <a:blip r:embed="rId4"/>
-                  <a:srcRect l="26293" t="10064" r="26062" b="10160"/>
-                  <a:stretch/>
-                </p:blipFill>
-                <p:spPr>
-                  <a:xfrm>
-                    <a:off x="8610489" y="1888585"/>
-                    <a:ext cx="724276" cy="681154"/>
-                  </a:xfrm>
-                  <a:prstGeom prst="rect">
-                    <a:avLst/>
-                  </a:prstGeom>
-                </p:spPr>
-              </p:pic>
+                <p:style>
+                  <a:lnRef idx="2">
+                    <a:schemeClr val="accent1">
+                      <a:shade val="50000"/>
+                    </a:schemeClr>
+                  </a:lnRef>
+                  <a:fillRef idx="1">
+                    <a:schemeClr val="accent1"/>
+                  </a:fillRef>
+                  <a:effectRef idx="0">
+                    <a:schemeClr val="accent1"/>
+                  </a:effectRef>
+                  <a:fontRef idx="minor">
+                    <a:schemeClr val="lt1"/>
+                  </a:fontRef>
+                </p:style>
+                <p:txBody>
+                  <a:bodyPr rtlCol="0" anchor="ctr"/>
+                  <a:lstStyle/>
+                  <a:p>
+                    <a:pPr algn="ctr"/>
+                    <a:endParaRPr kumimoji="1" lang="ko-KR" altLang="en-US"/>
+                  </a:p>
+                </p:txBody>
+              </p:sp>
             </p:grpSp>
             <p:sp>
               <p:nvSpPr>
-                <p:cNvPr id="108" name="직사각형 107">
+                <p:cNvPr id="111" name="TextBox 110">
                   <a:extLst>
                     <a:ext uri="{FF2B5EF4-FFF2-40B4-BE49-F238E27FC236}">
-                      <a16:creationId xmlns:a16="http://schemas.microsoft.com/office/drawing/2014/main" id="{3BDD12E5-F9BA-334C-A7A9-0D2074B88C83}"/>
+                      <a16:creationId xmlns:a16="http://schemas.microsoft.com/office/drawing/2014/main" id="{DDA23023-312A-B34B-B2CF-95AB81D21FA3}"/>
                     </a:ext>
                   </a:extLst>
                 </p:cNvPr>
-                <p:cNvSpPr/>
+                <p:cNvSpPr txBox="1"/>
                 <p:nvPr/>
               </p:nvSpPr>
               <p:spPr>
                 <a:xfrm>
-                  <a:off x="6314295" y="1782151"/>
-                  <a:ext cx="3184874" cy="913583"/>
+                  <a:off x="6433989" y="1367989"/>
+                  <a:ext cx="2153410" cy="369332"/>
                 </a:xfrm>
                 <a:prstGeom prst="rect">
                   <a:avLst/>
                 </a:prstGeom>
                 <a:noFill/>
-                <a:ln>
-                  <a:solidFill>
-                    <a:schemeClr val="tx1"/>
-                  </a:solidFill>
-                </a:ln>
               </p:spPr>
-              <p:style>
-                <a:lnRef idx="2">
-                  <a:schemeClr val="accent1">
-                    <a:shade val="50000"/>
-                  </a:schemeClr>
-                </a:lnRef>
-                <a:fillRef idx="1">
-                  <a:schemeClr val="accent1"/>
-                </a:fillRef>
-                <a:effectRef idx="0">
-                  <a:schemeClr val="accent1"/>
-                </a:effectRef>
-                <a:fontRef idx="minor">
-                  <a:schemeClr val="lt1"/>
-                </a:fontRef>
-              </p:style>
               <p:txBody>
-                <a:bodyPr rtlCol="0" anchor="ctr"/>
+                <a:bodyPr wrap="none" rtlCol="0">
+                  <a:spAutoFit/>
+                </a:bodyPr>
                 <a:lstStyle/>
                 <a:p>
-                  <a:pPr algn="ctr"/>
-                  <a:endParaRPr kumimoji="1" lang="ko-KR" altLang="en-US"/>
+                  <a:r>
+                    <a:rPr kumimoji="1" lang="en-US" altLang="ko-KR" dirty="0"/>
+                    <a:t>App Service Cluster`s</a:t>
+                  </a:r>
+                  <a:endParaRPr kumimoji="1" lang="ko-KR" altLang="en-US" dirty="0"/>
                 </a:p>
               </p:txBody>
             </p:sp>
           </p:grpSp>
-          <p:sp>
-            <p:nvSpPr>
-              <p:cNvPr id="111" name="TextBox 110">
-                <a:extLst>
-                  <a:ext uri="{FF2B5EF4-FFF2-40B4-BE49-F238E27FC236}">
-                    <a16:creationId xmlns:a16="http://schemas.microsoft.com/office/drawing/2014/main" id="{DDA23023-312A-B34B-B2CF-95AB81D21FA3}"/>
-                  </a:ext>
-                </a:extLst>
-              </p:cNvPr>
-              <p:cNvSpPr txBox="1"/>
-              <p:nvPr/>
-            </p:nvSpPr>
-            <p:spPr>
-              <a:xfrm>
-                <a:off x="6433989" y="1367989"/>
-                <a:ext cx="2153410" cy="369332"/>
-              </a:xfrm>
-              <a:prstGeom prst="rect">
-                <a:avLst/>
-              </a:prstGeom>
-              <a:noFill/>
-            </p:spPr>
-            <p:txBody>
-              <a:bodyPr wrap="none" rtlCol="0">
-                <a:spAutoFit/>
-              </a:bodyPr>
-              <a:lstStyle/>
-              <a:p>
-                <a:r>
-                  <a:rPr kumimoji="1" lang="en-US" altLang="ko-KR" dirty="0"/>
-                  <a:t>App Service Cluster`s</a:t>
-                </a:r>
-                <a:endParaRPr kumimoji="1" lang="ko-KR" altLang="en-US" dirty="0"/>
-              </a:p>
-            </p:txBody>
-          </p:sp>
-        </p:grpSp>
-        <p:grpSp>
-          <p:nvGrpSpPr>
-            <p:cNvPr id="114" name="그룹 113">
-              <a:extLst>
-                <a:ext uri="{FF2B5EF4-FFF2-40B4-BE49-F238E27FC236}">
-                  <a16:creationId xmlns:a16="http://schemas.microsoft.com/office/drawing/2014/main" id="{32367112-9B5C-504B-B026-E84C08D2885A}"/>
-                </a:ext>
-              </a:extLst>
-            </p:cNvPr>
-            <p:cNvGrpSpPr/>
-            <p:nvPr/>
-          </p:nvGrpSpPr>
-          <p:grpSpPr>
-            <a:xfrm>
-              <a:off x="6835998" y="3283896"/>
-              <a:ext cx="5089296" cy="4646078"/>
-              <a:chOff x="5507260" y="2940996"/>
-              <a:chExt cx="5089296" cy="4646078"/>
-            </a:xfrm>
-          </p:grpSpPr>
           <p:sp>
             <p:nvSpPr>
               <p:cNvPr id="106" name="직사각형 105">
@@ -3309,7 +3309,7 @@
             </p:nvSpPr>
             <p:spPr>
               <a:xfrm>
-                <a:off x="5897880" y="3355961"/>
+                <a:off x="7226618" y="3698861"/>
                 <a:ext cx="4510997" cy="3998357"/>
               </a:xfrm>
               <a:prstGeom prst="rect">
@@ -3369,7 +3369,7 @@
             </p:blipFill>
             <p:spPr>
               <a:xfrm>
-                <a:off x="10131043" y="7121561"/>
+                <a:off x="11459781" y="7464461"/>
                 <a:ext cx="465513" cy="465513"/>
               </a:xfrm>
               <a:prstGeom prst="rect">
@@ -3391,7 +3391,7 @@
             </p:nvGrpSpPr>
             <p:grpSpPr>
               <a:xfrm>
-                <a:off x="7561777" y="3458689"/>
+                <a:off x="8890515" y="3801589"/>
                 <a:ext cx="2479514" cy="1522516"/>
                 <a:chOff x="8672710" y="2957466"/>
                 <a:chExt cx="2479514" cy="1522516"/>
@@ -3821,7 +3821,7 @@
             </p:nvGrpSpPr>
             <p:grpSpPr>
               <a:xfrm>
-                <a:off x="5507260" y="4448885"/>
+                <a:off x="6835998" y="4791785"/>
                 <a:ext cx="4482885" cy="2721625"/>
                 <a:chOff x="6618193" y="3947662"/>
                 <a:chExt cx="4482885" cy="2721625"/>
@@ -4227,7 +4227,7 @@
             </p:nvSpPr>
             <p:spPr>
               <a:xfrm>
-                <a:off x="6055290" y="2940996"/>
+                <a:off x="7384028" y="3283896"/>
                 <a:ext cx="2153410" cy="369332"/>
               </a:xfrm>
               <a:prstGeom prst="rect">
@@ -4263,7 +4263,7 @@
             </p:nvSpPr>
             <p:spPr>
               <a:xfrm>
-                <a:off x="9429827" y="7121561"/>
+                <a:off x="10758565" y="7464461"/>
                 <a:ext cx="715260" cy="246221"/>
               </a:xfrm>
               <a:prstGeom prst="rect">
@@ -4296,6 +4296,7 @@
               </a:extLst>
             </p:cNvPr>
             <p:cNvCxnSpPr>
+              <a:cxnSpLocks/>
               <a:stCxn id="7" idx="3"/>
               <a:endCxn id="108" idx="1"/>
             </p:cNvCxnSpPr>
@@ -4303,12 +4304,12 @@
           </p:nvCxnSpPr>
           <p:spPr>
             <a:xfrm flipV="1">
-              <a:off x="5084753" y="2626582"/>
-              <a:ext cx="2139698" cy="596718"/>
+              <a:off x="5218018" y="2626582"/>
+              <a:ext cx="2006433" cy="596718"/>
             </a:xfrm>
             <a:prstGeom prst="bentConnector3">
               <a:avLst>
-                <a:gd name="adj1" fmla="val 60150"/>
+                <a:gd name="adj1" fmla="val 50000"/>
               </a:avLst>
             </a:prstGeom>
             <a:ln>
@@ -4340,6 +4341,7 @@
               </a:extLst>
             </p:cNvPr>
             <p:cNvCxnSpPr>
+              <a:cxnSpLocks/>
               <a:stCxn id="7" idx="3"/>
               <a:endCxn id="24" idx="1"/>
             </p:cNvCxnSpPr>
@@ -4347,12 +4349,12 @@
           </p:nvCxnSpPr>
           <p:spPr>
             <a:xfrm>
-              <a:off x="5084753" y="3223300"/>
-              <a:ext cx="1751245" cy="1972003"/>
+              <a:off x="5218018" y="3223300"/>
+              <a:ext cx="1617980" cy="1972003"/>
             </a:xfrm>
             <a:prstGeom prst="bentConnector3">
               <a:avLst>
-                <a:gd name="adj1" fmla="val 73496"/>
+                <a:gd name="adj1" fmla="val 50000"/>
               </a:avLst>
             </a:prstGeom>
             <a:ln>
@@ -4588,12 +4590,42 @@
             </p:txBody>
           </p:sp>
         </p:grpSp>
+        <p:pic>
+          <p:nvPicPr>
+            <p:cNvPr id="11" name="그림 10">
+              <a:extLst>
+                <a:ext uri="{FF2B5EF4-FFF2-40B4-BE49-F238E27FC236}">
+                  <a16:creationId xmlns:a16="http://schemas.microsoft.com/office/drawing/2014/main" id="{ACDF2139-A891-A948-839C-B8EB95DAE3B0}"/>
+                </a:ext>
+              </a:extLst>
+            </p:cNvPr>
+            <p:cNvPicPr>
+              <a:picLocks noChangeAspect="1"/>
+            </p:cNvPicPr>
+            <p:nvPr/>
+          </p:nvPicPr>
+          <p:blipFill>
+            <a:blip r:embed="rId8"/>
+            <a:stretch>
+              <a:fillRect/>
+            </a:stretch>
+          </p:blipFill>
+          <p:spPr>
+            <a:xfrm>
+              <a:off x="1909218" y="4790951"/>
+              <a:ext cx="807036" cy="807036"/>
+            </a:xfrm>
+            <a:prstGeom prst="rect">
+              <a:avLst/>
+            </a:prstGeom>
+          </p:spPr>
+        </p:pic>
         <p:grpSp>
           <p:nvGrpSpPr>
-            <p:cNvPr id="10" name="그룹 9">
+            <p:cNvPr id="20" name="그룹 19">
               <a:extLst>
                 <a:ext uri="{FF2B5EF4-FFF2-40B4-BE49-F238E27FC236}">
-                  <a16:creationId xmlns:a16="http://schemas.microsoft.com/office/drawing/2014/main" id="{0B06D174-506A-7A40-829B-C0064ECCBAF1}"/>
+                  <a16:creationId xmlns:a16="http://schemas.microsoft.com/office/drawing/2014/main" id="{8EC562F8-2876-0E42-8A6B-A5FF0BA72E5F}"/>
                 </a:ext>
               </a:extLst>
             </p:cNvPr>
@@ -4602,10 +4634,10 @@
           </p:nvGrpSpPr>
           <p:grpSpPr>
             <a:xfrm>
-              <a:off x="1909218" y="1096170"/>
-              <a:ext cx="3760371" cy="6452973"/>
-              <a:chOff x="1909218" y="1096170"/>
-              <a:chExt cx="3760371" cy="6452973"/>
+              <a:off x="2359812" y="1096170"/>
+              <a:ext cx="3309777" cy="6452973"/>
+              <a:chOff x="2359812" y="1096170"/>
+              <a:chExt cx="3309777" cy="6452973"/>
             </a:xfrm>
           </p:grpSpPr>
           <p:grpSp>
@@ -4994,36 +5026,6 @@
               </p:txBody>
             </p:sp>
           </p:grpSp>
-          <p:pic>
-            <p:nvPicPr>
-              <p:cNvPr id="11" name="그림 10">
-                <a:extLst>
-                  <a:ext uri="{FF2B5EF4-FFF2-40B4-BE49-F238E27FC236}">
-                    <a16:creationId xmlns:a16="http://schemas.microsoft.com/office/drawing/2014/main" id="{ACDF2139-A891-A948-839C-B8EB95DAE3B0}"/>
-                  </a:ext>
-                </a:extLst>
-              </p:cNvPr>
-              <p:cNvPicPr>
-                <a:picLocks noChangeAspect="1"/>
-              </p:cNvPicPr>
-              <p:nvPr/>
-            </p:nvPicPr>
-            <p:blipFill>
-              <a:blip r:embed="rId8"/>
-              <a:stretch>
-                <a:fillRect/>
-              </a:stretch>
-            </p:blipFill>
-            <p:spPr>
-              <a:xfrm>
-                <a:off x="1909218" y="4790951"/>
-                <a:ext cx="807036" cy="807036"/>
-              </a:xfrm>
-              <a:prstGeom prst="rect">
-                <a:avLst/>
-              </a:prstGeom>
-            </p:spPr>
-          </p:pic>
           <p:cxnSp>
             <p:nvCxnSpPr>
               <p:cNvPr id="136" name="꺾인 연결선[E] 135">
@@ -5034,6 +5036,7 @@
                 </a:extLst>
               </p:cNvPr>
               <p:cNvCxnSpPr>
+                <a:cxnSpLocks/>
                 <a:stCxn id="9" idx="2"/>
                 <a:endCxn id="15" idx="0"/>
               </p:cNvCxnSpPr>
@@ -5041,8 +5044,8 @@
             </p:nvCxnSpPr>
             <p:spPr>
               <a:xfrm rot="5400000">
-                <a:off x="3652782" y="5086266"/>
-                <a:ext cx="807829" cy="939"/>
+                <a:off x="3786752" y="4952296"/>
+                <a:ext cx="807829" cy="268879"/>
               </a:xfrm>
               <a:prstGeom prst="bentConnector3">
                 <a:avLst/>
@@ -5102,7 +5105,7 @@
               <p:spPr>
                 <a:xfrm>
                   <a:off x="3437764" y="3038634"/>
-                  <a:ext cx="1646989" cy="369332"/>
+                  <a:ext cx="1780254" cy="369332"/>
                 </a:xfrm>
                 <a:prstGeom prst="rect">
                   <a:avLst/>
@@ -5115,7 +5118,7 @@
                 </a:ln>
               </p:spPr>
               <p:txBody>
-                <a:bodyPr wrap="none" rtlCol="0">
+                <a:bodyPr wrap="square" rtlCol="0">
                   <a:spAutoFit/>
                 </a:bodyPr>
                 <a:lstStyle/>
@@ -5142,8 +5145,8 @@
               </p:nvSpPr>
               <p:spPr>
                 <a:xfrm>
-                  <a:off x="3438994" y="3672205"/>
-                  <a:ext cx="1481368" cy="369332"/>
+                  <a:off x="3438993" y="3672205"/>
+                  <a:ext cx="1774681" cy="369332"/>
                 </a:xfrm>
                 <a:prstGeom prst="rect">
                   <a:avLst/>
@@ -5156,7 +5159,7 @@
                 </a:ln>
               </p:spPr>
               <p:txBody>
-                <a:bodyPr wrap="none" rtlCol="0">
+                <a:bodyPr wrap="square" rtlCol="0">
                   <a:spAutoFit/>
                 </a:bodyPr>
                 <a:lstStyle/>
@@ -5184,7 +5187,7 @@
               <p:spPr>
                 <a:xfrm>
                   <a:off x="3437764" y="4313489"/>
-                  <a:ext cx="1238801" cy="369332"/>
+                  <a:ext cx="1774681" cy="369332"/>
                 </a:xfrm>
                 <a:prstGeom prst="rect">
                   <a:avLst/>
@@ -5197,7 +5200,7 @@
                 </a:ln>
               </p:spPr>
               <p:txBody>
-                <a:bodyPr wrap="none" rtlCol="0">
+                <a:bodyPr wrap="square" rtlCol="0">
                   <a:spAutoFit/>
                 </a:bodyPr>
                 <a:lstStyle/>
@@ -5259,6 +5262,7 @@
                   </a:extLst>
                 </p:cNvPr>
                 <p:cNvCxnSpPr>
+                  <a:cxnSpLocks/>
                   <a:stCxn id="8" idx="0"/>
                   <a:endCxn id="7" idx="2"/>
                 </p:cNvCxnSpPr>
@@ -5266,8 +5270,8 @@
               </p:nvCxnSpPr>
               <p:spPr>
                 <a:xfrm rot="5400000" flipH="1" flipV="1">
-                  <a:off x="4088349" y="3499296"/>
-                  <a:ext cx="264239" cy="81581"/>
+                  <a:off x="4194993" y="3539308"/>
+                  <a:ext cx="264239" cy="1557"/>
                 </a:xfrm>
                 <a:prstGeom prst="bentConnector3">
                   <a:avLst/>
@@ -5365,7 +5369,7 @@
               </p:blipFill>
               <p:spPr>
                 <a:xfrm>
-                  <a:off x="4810386" y="3897933"/>
+                  <a:off x="4947546" y="3890313"/>
                   <a:ext cx="407632" cy="311368"/>
                 </a:xfrm>
                 <a:prstGeom prst="rect">
@@ -5404,6 +5408,51 @@
             </p:pic>
           </p:grpSp>
         </p:grpSp>
+        <p:cxnSp>
+          <p:nvCxnSpPr>
+            <p:cNvPr id="22" name="꺾인 연결선[E] 21">
+              <a:extLst>
+                <a:ext uri="{FF2B5EF4-FFF2-40B4-BE49-F238E27FC236}">
+                  <a16:creationId xmlns:a16="http://schemas.microsoft.com/office/drawing/2014/main" id="{B1BC3171-7F72-154B-B4DF-00346A67D35E}"/>
+                </a:ext>
+              </a:extLst>
+            </p:cNvPr>
+            <p:cNvCxnSpPr>
+              <a:stCxn id="54" idx="2"/>
+              <a:endCxn id="13" idx="3"/>
+            </p:cNvCxnSpPr>
+            <p:nvPr/>
+          </p:nvCxnSpPr>
+          <p:spPr>
+            <a:xfrm rot="5400000" flipH="1">
+              <a:off x="7611005" y="3447571"/>
+              <a:ext cx="402363" cy="6031442"/>
+            </a:xfrm>
+            <a:prstGeom prst="bentConnector4">
+              <a:avLst>
+                <a:gd name="adj1" fmla="val -347864"/>
+                <a:gd name="adj2" fmla="val 75082"/>
+              </a:avLst>
+            </a:prstGeom>
+            <a:ln>
+              <a:tailEnd type="triangle"/>
+            </a:ln>
+          </p:spPr>
+          <p:style>
+            <a:lnRef idx="1">
+              <a:schemeClr val="dk1"/>
+            </a:lnRef>
+            <a:fillRef idx="0">
+              <a:schemeClr val="dk1"/>
+            </a:fillRef>
+            <a:effectRef idx="0">
+              <a:schemeClr val="dk1"/>
+            </a:effectRef>
+            <a:fontRef idx="minor">
+              <a:schemeClr val="tx1"/>
+            </a:fontRef>
+          </p:style>
+        </p:cxnSp>
       </p:grpSp>
     </p:spTree>
     <p:extLst>

</xml_diff>